<commit_message>
Compute deck layout fixes partial
</commit_message>
<xml_diff>
--- a/Presentations/2018-05-14-Boston/70-535-Compute.pptx
+++ b/Presentations/2018-05-14-Boston/70-535-Compute.pptx
@@ -21,40 +21,40 @@
   <p:notesSz cx="6858000" cy="9144000"/>
   <p:embeddedFontLst>
     <p:embeddedFont>
-      <p:font typeface="Verdana" panose="020B0604030504040204" pitchFamily="34" charset="0"/>
+      <p:font typeface="Calibri" panose="020F0502020204030204" pitchFamily="34" charset="0"/>
       <p:regular r:id="rId9"/>
       <p:bold r:id="rId10"/>
       <p:italic r:id="rId11"/>
       <p:boldItalic r:id="rId12"/>
     </p:embeddedFont>
     <p:embeddedFont>
-      <p:font typeface="Segoe UI Light" panose="020B0502040204020203" pitchFamily="34" charset="0"/>
+      <p:font typeface="Consolas" panose="020B0609020204030204" pitchFamily="49" charset="0"/>
       <p:regular r:id="rId13"/>
-      <p:italic r:id="rId14"/>
-    </p:embeddedFont>
-    <p:embeddedFont>
-      <p:font typeface="Calibri" panose="020F0502020204030204" pitchFamily="34" charset="0"/>
-      <p:regular r:id="rId15"/>
-      <p:bold r:id="rId16"/>
-      <p:italic r:id="rId17"/>
-      <p:boldItalic r:id="rId18"/>
-    </p:embeddedFont>
-    <p:embeddedFont>
-      <p:font typeface="Consolas" panose="020B0609020204030204" pitchFamily="49" charset="0"/>
-      <p:regular r:id="rId19"/>
-      <p:bold r:id="rId20"/>
-      <p:italic r:id="rId21"/>
-      <p:boldItalic r:id="rId22"/>
+      <p:bold r:id="rId14"/>
+      <p:italic r:id="rId15"/>
+      <p:boldItalic r:id="rId16"/>
     </p:embeddedFont>
     <p:embeddedFont>
       <p:font typeface="Segoe UI" panose="020B0502040204020203" pitchFamily="34" charset="0"/>
+      <p:regular r:id="rId17"/>
+      <p:bold r:id="rId18"/>
+      <p:italic r:id="rId19"/>
+      <p:boldItalic r:id="rId20"/>
+    </p:embeddedFont>
+    <p:embeddedFont>
+      <p:font typeface="Calibri Light" panose="020F0302020204030204" pitchFamily="34" charset="0"/>
+      <p:regular r:id="rId21"/>
+      <p:italic r:id="rId22"/>
+    </p:embeddedFont>
+    <p:embeddedFont>
+      <p:font typeface="Verdana" panose="020B0604030504040204" pitchFamily="34" charset="0"/>
       <p:regular r:id="rId23"/>
       <p:bold r:id="rId24"/>
       <p:italic r:id="rId25"/>
       <p:boldItalic r:id="rId26"/>
     </p:embeddedFont>
     <p:embeddedFont>
-      <p:font typeface="Calibri Light" panose="020F0302020204030204" pitchFamily="34" charset="0"/>
+      <p:font typeface="Segoe UI Light" panose="020B0502040204020203" pitchFamily="34" charset="0"/>
       <p:regular r:id="rId27"/>
       <p:italic r:id="rId28"/>
     </p:embeddedFont>
@@ -216,6 +216,10 @@
 </p:presentation>
 </file>
 
+<file path=ppt/revisionInfo.xml><?xml version="1.0" encoding="utf-8"?>
+<p1510:revInfo xmlns:a="http://schemas.openxmlformats.org/drawingml/2006/main" xmlns:r="http://schemas.openxmlformats.org/officeDocument/2006/relationships" xmlns:p1510="http://schemas.microsoft.com/office/powerpoint/2015/10/main"/>
+</file>
+
 <file path=ppt/handoutMasters/handoutMaster1.xml><?xml version="1.0" encoding="utf-8"?>
 <p:handoutMaster xmlns:a="http://schemas.openxmlformats.org/drawingml/2006/main" xmlns:r="http://schemas.openxmlformats.org/officeDocument/2006/relationships" xmlns:p="http://schemas.openxmlformats.org/presentationml/2006/main">
   <p:cSld>
@@ -310,7 +314,7 @@
           <a:p>
             <a:fld id="{7D784404-57E5-4341-9230-5EC072B8C3C5}" type="datetimeFigureOut">
               <a:rPr lang="en-US" smtClean="0"/>
-              <a:t>5/12/2018</a:t>
+              <a:t>5/14/2018</a:t>
             </a:fld>
             <a:endParaRPr lang="en-US"/>
           </a:p>
@@ -487,7 +491,7 @@
           <a:p>
             <a:fld id="{9933EFA3-31EF-403B-8080-9776000D59FF}" type="datetimeFigureOut">
               <a:rPr lang="en-US" smtClean="0"/>
-              <a:t>5/12/2018</a:t>
+              <a:t>5/14/2018</a:t>
             </a:fld>
             <a:endParaRPr lang="en-US" dirty="0"/>
           </a:p>
@@ -10685,7 +10689,7 @@
         </p:nvGraphicFramePr>
         <p:xfrm>
           <a:off x="261188" y="2748511"/>
-          <a:ext cx="4126043" cy="2995574"/>
+          <a:ext cx="4126043" cy="2982620"/>
         </p:xfrm>
         <a:graphic>
           <a:graphicData uri="http://schemas.openxmlformats.org/drawingml/2006/table">
@@ -18545,31 +18549,6 @@
             <a:br>
               <a:rPr lang="en-US" dirty="0"/>
             </a:br>
-            <a:endParaRPr lang="en-US" dirty="0"/>
-          </a:p>
-        </p:txBody>
-      </p:sp>
-      <p:sp>
-        <p:nvSpPr>
-          <p:cNvPr id="9" name="Subtitle 8">
-            <a:extLst>
-              <a:ext uri="{FF2B5EF4-FFF2-40B4-BE49-F238E27FC236}">
-                <a16:creationId xmlns:a16="http://schemas.microsoft.com/office/drawing/2014/main" id="{F50AF2F1-76EF-43D7-9BD8-1A955FB64935}"/>
-              </a:ext>
-            </a:extLst>
-          </p:cNvPr>
-          <p:cNvSpPr>
-            <a:spLocks noGrp="1"/>
-          </p:cNvSpPr>
-          <p:nvPr>
-            <p:ph type="subTitle" sz="quarter" idx="1"/>
-          </p:nvPr>
-        </p:nvSpPr>
-        <p:spPr/>
-        <p:txBody>
-          <a:bodyPr/>
-          <a:lstStyle/>
-          <a:p>
             <a:endParaRPr lang="en-US" dirty="0"/>
           </a:p>
         </p:txBody>

</xml_diff>